<commit_message>
Power Point feito -- Grafico e foto add
</commit_message>
<xml_diff>
--- a/Documentation/Pitch Power Point.pptx
+++ b/Documentation/Pitch Power Point.pptx
@@ -5,10 +5,10 @@
     <p:sldMasterId id="2147483720" r:id="rId4"/>
   </p:sldMasterIdLst>
   <p:notesMasterIdLst>
-    <p:notesMasterId r:id="rId12"/>
+    <p:notesMasterId r:id="rId13"/>
   </p:notesMasterIdLst>
   <p:handoutMasterIdLst>
-    <p:handoutMasterId r:id="rId13"/>
+    <p:handoutMasterId r:id="rId14"/>
   </p:handoutMasterIdLst>
   <p:sldIdLst>
     <p:sldId id="281" r:id="rId5"/>
@@ -17,7 +17,8 @@
     <p:sldId id="362" r:id="rId8"/>
     <p:sldId id="363" r:id="rId9"/>
     <p:sldId id="360" r:id="rId10"/>
-    <p:sldId id="364" r:id="rId11"/>
+    <p:sldId id="365" r:id="rId11"/>
+    <p:sldId id="364" r:id="rId12"/>
   </p:sldIdLst>
   <p:sldSz cx="12192000" cy="6858000"/>
   <p:notesSz cx="6858000" cy="9144000"/>
@@ -149,6 +150,854 @@
 </p188:authorLst>
 </file>
 
+<file path=ppt/charts/chart1.xml><?xml version="1.0" encoding="utf-8"?>
+<c:chartSpace xmlns:c="http://schemas.openxmlformats.org/drawingml/2006/chart" xmlns:a="http://schemas.openxmlformats.org/drawingml/2006/main" xmlns:r="http://schemas.openxmlformats.org/officeDocument/2006/relationships" xmlns:c16r2="http://schemas.microsoft.com/office/drawing/2015/06/chart">
+  <c:date1904 val="0"/>
+  <c:lang val="pt-BR"/>
+  <c:roundedCorners val="0"/>
+  <mc:AlternateContent xmlns:mc="http://schemas.openxmlformats.org/markup-compatibility/2006">
+    <mc:Choice xmlns:c14="http://schemas.microsoft.com/office/drawing/2007/8/2/chart" Requires="c14">
+      <c14:style val="102"/>
+    </mc:Choice>
+    <mc:Fallback>
+      <c:style val="2"/>
+    </mc:Fallback>
+  </mc:AlternateContent>
+  <c:chart>
+    <c:title>
+      <c:overlay val="0"/>
+      <c:spPr>
+        <a:noFill/>
+        <a:ln>
+          <a:noFill/>
+        </a:ln>
+        <a:effectLst/>
+      </c:spPr>
+      <c:txPr>
+        <a:bodyPr rot="0" spcFirstLastPara="1" vertOverflow="ellipsis" vert="horz" wrap="square" anchor="ctr" anchorCtr="1"/>
+        <a:lstStyle/>
+        <a:p>
+          <a:pPr>
+            <a:defRPr sz="1862" b="0" i="0" u="none" strike="noStrike" kern="1200" spc="0" baseline="0">
+              <a:solidFill>
+                <a:schemeClr val="tx1">
+                  <a:lumMod val="65000"/>
+                  <a:lumOff val="35000"/>
+                </a:schemeClr>
+              </a:solidFill>
+              <a:latin typeface="+mn-lt"/>
+              <a:ea typeface="+mn-ea"/>
+              <a:cs typeface="+mn-cs"/>
+            </a:defRPr>
+          </a:pPr>
+          <a:endParaRPr lang="pt-BR"/>
+        </a:p>
+      </c:txPr>
+    </c:title>
+    <c:autoTitleDeleted val="0"/>
+    <c:plotArea>
+      <c:layout>
+        <c:manualLayout>
+          <c:layoutTarget val="inner"/>
+          <c:xMode val="edge"/>
+          <c:yMode val="edge"/>
+          <c:x val="0.16014711295597539"/>
+          <c:y val="0.10605666849590396"/>
+          <c:w val="0.67970595088950581"/>
+          <c:h val="0.79104924763613771"/>
+        </c:manualLayout>
+      </c:layout>
+      <c:pieChart>
+        <c:varyColors val="1"/>
+        <c:ser>
+          <c:idx val="0"/>
+          <c:order val="0"/>
+          <c:tx>
+            <c:strRef>
+              <c:f>Planilha1!$B$1</c:f>
+              <c:strCache>
+                <c:ptCount val="1"/>
+                <c:pt idx="0">
+                  <c:v>Clientes</c:v>
+                </c:pt>
+              </c:strCache>
+            </c:strRef>
+          </c:tx>
+          <c:dPt>
+            <c:idx val="0"/>
+            <c:bubble3D val="0"/>
+            <c:spPr>
+              <a:solidFill>
+                <a:schemeClr val="accent1"/>
+              </a:solidFill>
+              <a:ln w="19050">
+                <a:solidFill>
+                  <a:schemeClr val="lt1"/>
+                </a:solidFill>
+              </a:ln>
+              <a:effectLst/>
+            </c:spPr>
+            <c:extLst>
+              <c:ext xmlns:c16="http://schemas.microsoft.com/office/drawing/2014/chart" uri="{C3380CC4-5D6E-409C-BE32-E72D297353CC}">
+                <c16:uniqueId val="{00000001-58B3-42D5-969C-E7A92B255C55}"/>
+              </c:ext>
+            </c:extLst>
+          </c:dPt>
+          <c:dPt>
+            <c:idx val="1"/>
+            <c:bubble3D val="0"/>
+            <c:spPr>
+              <a:solidFill>
+                <a:schemeClr val="accent2"/>
+              </a:solidFill>
+              <a:ln w="19050">
+                <a:solidFill>
+                  <a:schemeClr val="lt1"/>
+                </a:solidFill>
+              </a:ln>
+              <a:effectLst/>
+            </c:spPr>
+            <c:extLst>
+              <c:ext xmlns:c16="http://schemas.microsoft.com/office/drawing/2014/chart" uri="{C3380CC4-5D6E-409C-BE32-E72D297353CC}">
+                <c16:uniqueId val="{00000003-58B3-42D5-969C-E7A92B255C55}"/>
+              </c:ext>
+            </c:extLst>
+          </c:dPt>
+          <c:dLbls>
+            <c:spPr>
+              <a:noFill/>
+              <a:ln>
+                <a:noFill/>
+              </a:ln>
+              <a:effectLst/>
+            </c:spPr>
+            <c:txPr>
+              <a:bodyPr rot="0" spcFirstLastPara="1" vertOverflow="ellipsis" vert="horz" wrap="square" lIns="38100" tIns="19050" rIns="38100" bIns="19050" anchor="ctr" anchorCtr="1">
+                <a:spAutoFit/>
+              </a:bodyPr>
+              <a:lstStyle/>
+              <a:p>
+                <a:pPr>
+                  <a:defRPr sz="1197" b="0" i="0" u="none" strike="noStrike" kern="1200" baseline="0">
+                    <a:solidFill>
+                      <a:schemeClr val="tx1">
+                        <a:lumMod val="75000"/>
+                        <a:lumOff val="25000"/>
+                      </a:schemeClr>
+                    </a:solidFill>
+                    <a:latin typeface="+mn-lt"/>
+                    <a:ea typeface="+mn-ea"/>
+                    <a:cs typeface="+mn-cs"/>
+                  </a:defRPr>
+                </a:pPr>
+                <a:endParaRPr lang="pt-BR"/>
+              </a:p>
+            </c:txPr>
+            <c:dLblPos val="inEnd"/>
+            <c:showLegendKey val="0"/>
+            <c:showVal val="0"/>
+            <c:showCatName val="0"/>
+            <c:showSerName val="0"/>
+            <c:showPercent val="1"/>
+            <c:showBubbleSize val="0"/>
+            <c:showLeaderLines val="1"/>
+            <c:leaderLines>
+              <c:spPr>
+                <a:ln w="9525" cap="flat" cmpd="sng" algn="ctr">
+                  <a:solidFill>
+                    <a:schemeClr val="tx1">
+                      <a:lumMod val="35000"/>
+                      <a:lumOff val="65000"/>
+                    </a:schemeClr>
+                  </a:solidFill>
+                  <a:round/>
+                </a:ln>
+                <a:effectLst/>
+              </c:spPr>
+            </c:leaderLines>
+            <c:extLst>
+              <c:ext xmlns:c15="http://schemas.microsoft.com/office/drawing/2012/chart" uri="{CE6537A1-D6FC-4f65-9D91-7224C49458BB}"/>
+            </c:extLst>
+          </c:dLbls>
+          <c:cat>
+            <c:strRef>
+              <c:f>Planilha1!$A$2:$A$3</c:f>
+              <c:strCache>
+                <c:ptCount val="2"/>
+                <c:pt idx="0">
+                  <c:v>Free</c:v>
+                </c:pt>
+                <c:pt idx="1">
+                  <c:v>Pago</c:v>
+                </c:pt>
+              </c:strCache>
+            </c:strRef>
+          </c:cat>
+          <c:val>
+            <c:numRef>
+              <c:f>Planilha1!$B$2:$B$3</c:f>
+              <c:numCache>
+                <c:formatCode>General</c:formatCode>
+                <c:ptCount val="2"/>
+                <c:pt idx="0">
+                  <c:v>2000</c:v>
+                </c:pt>
+                <c:pt idx="1">
+                  <c:v>1000</c:v>
+                </c:pt>
+              </c:numCache>
+            </c:numRef>
+          </c:val>
+          <c:extLst>
+            <c:ext xmlns:c16="http://schemas.microsoft.com/office/drawing/2014/chart" uri="{C3380CC4-5D6E-409C-BE32-E72D297353CC}">
+              <c16:uniqueId val="{00000004-58B3-42D5-969C-E7A92B255C55}"/>
+            </c:ext>
+          </c:extLst>
+        </c:ser>
+        <c:dLbls>
+          <c:dLblPos val="inEnd"/>
+          <c:showLegendKey val="0"/>
+          <c:showVal val="0"/>
+          <c:showCatName val="0"/>
+          <c:showSerName val="0"/>
+          <c:showPercent val="1"/>
+          <c:showBubbleSize val="0"/>
+          <c:showLeaderLines val="1"/>
+        </c:dLbls>
+        <c:firstSliceAng val="0"/>
+      </c:pieChart>
+      <c:spPr>
+        <a:noFill/>
+        <a:ln>
+          <a:noFill/>
+        </a:ln>
+        <a:effectLst/>
+      </c:spPr>
+    </c:plotArea>
+    <c:legend>
+      <c:legendPos val="b"/>
+      <c:overlay val="0"/>
+      <c:spPr>
+        <a:noFill/>
+        <a:ln>
+          <a:noFill/>
+        </a:ln>
+        <a:effectLst/>
+      </c:spPr>
+      <c:txPr>
+        <a:bodyPr rot="0" spcFirstLastPara="1" vertOverflow="ellipsis" vert="horz" wrap="square" anchor="ctr" anchorCtr="1"/>
+        <a:lstStyle/>
+        <a:p>
+          <a:pPr>
+            <a:defRPr sz="1197" b="0" i="0" u="none" strike="noStrike" kern="1200" baseline="0">
+              <a:solidFill>
+                <a:schemeClr val="tx1">
+                  <a:lumMod val="65000"/>
+                  <a:lumOff val="35000"/>
+                </a:schemeClr>
+              </a:solidFill>
+              <a:latin typeface="+mn-lt"/>
+              <a:ea typeface="+mn-ea"/>
+              <a:cs typeface="+mn-cs"/>
+            </a:defRPr>
+          </a:pPr>
+          <a:endParaRPr lang="pt-BR"/>
+        </a:p>
+      </c:txPr>
+    </c:legend>
+    <c:plotVisOnly val="1"/>
+    <c:dispBlanksAs val="gap"/>
+    <c:extLst>
+      <c:ext xmlns:c16r3="http://schemas.microsoft.com/office/drawing/2017/03/chart" uri="{56B9EC1D-385E-4148-901F-78D8002777C0}">
+        <c16r3:dataDisplayOptions16>
+          <c16r3:dispNaAsBlank val="1"/>
+        </c16r3:dataDisplayOptions16>
+      </c:ext>
+    </c:extLst>
+    <c:showDLblsOverMax val="0"/>
+  </c:chart>
+  <c:spPr>
+    <a:noFill/>
+    <a:ln>
+      <a:noFill/>
+    </a:ln>
+    <a:effectLst/>
+  </c:spPr>
+  <c:txPr>
+    <a:bodyPr/>
+    <a:lstStyle/>
+    <a:p>
+      <a:pPr>
+        <a:defRPr/>
+      </a:pPr>
+      <a:endParaRPr lang="pt-BR"/>
+    </a:p>
+  </c:txPr>
+  <c:externalData r:id="rId3">
+    <c:autoUpdate val="0"/>
+  </c:externalData>
+</c:chartSpace>
+</file>
+
+<file path=ppt/charts/colors1.xml><?xml version="1.0" encoding="utf-8"?>
+<cs:colorStyle xmlns:cs="http://schemas.microsoft.com/office/drawing/2012/chartStyle" xmlns:a="http://schemas.openxmlformats.org/drawingml/2006/main" meth="cycle" id="10">
+  <a:schemeClr val="accent1"/>
+  <a:schemeClr val="accent2"/>
+  <a:schemeClr val="accent3"/>
+  <a:schemeClr val="accent4"/>
+  <a:schemeClr val="accent5"/>
+  <a:schemeClr val="accent6"/>
+  <cs:variation/>
+  <cs:variation>
+    <a:lumMod val="60000"/>
+  </cs:variation>
+  <cs:variation>
+    <a:lumMod val="80000"/>
+    <a:lumOff val="20000"/>
+  </cs:variation>
+  <cs:variation>
+    <a:lumMod val="80000"/>
+  </cs:variation>
+  <cs:variation>
+    <a:lumMod val="60000"/>
+    <a:lumOff val="40000"/>
+  </cs:variation>
+  <cs:variation>
+    <a:lumMod val="50000"/>
+  </cs:variation>
+  <cs:variation>
+    <a:lumMod val="70000"/>
+    <a:lumOff val="30000"/>
+  </cs:variation>
+  <cs:variation>
+    <a:lumMod val="70000"/>
+  </cs:variation>
+  <cs:variation>
+    <a:lumMod val="50000"/>
+    <a:lumOff val="50000"/>
+  </cs:variation>
+</cs:colorStyle>
+</file>
+
+<file path=ppt/charts/style1.xml><?xml version="1.0" encoding="utf-8"?>
+<cs:chartStyle xmlns:cs="http://schemas.microsoft.com/office/drawing/2012/chartStyle" xmlns:a="http://schemas.openxmlformats.org/drawingml/2006/main" id="251">
+  <cs:axisTitle>
+    <cs:lnRef idx="0"/>
+    <cs:fillRef idx="0"/>
+    <cs:effectRef idx="0"/>
+    <cs:fontRef idx="minor">
+      <a:schemeClr val="tx1">
+        <a:lumMod val="65000"/>
+        <a:lumOff val="35000"/>
+      </a:schemeClr>
+    </cs:fontRef>
+    <cs:defRPr sz="1330" kern="1200"/>
+  </cs:axisTitle>
+  <cs:categoryAxis>
+    <cs:lnRef idx="0"/>
+    <cs:fillRef idx="0"/>
+    <cs:effectRef idx="0"/>
+    <cs:fontRef idx="minor">
+      <a:schemeClr val="tx1">
+        <a:lumMod val="65000"/>
+        <a:lumOff val="35000"/>
+      </a:schemeClr>
+    </cs:fontRef>
+    <cs:spPr>
+      <a:ln w="9525" cap="flat" cmpd="sng" algn="ctr">
+        <a:solidFill>
+          <a:schemeClr val="tx1">
+            <a:lumMod val="15000"/>
+            <a:lumOff val="85000"/>
+          </a:schemeClr>
+        </a:solidFill>
+        <a:round/>
+      </a:ln>
+    </cs:spPr>
+    <cs:defRPr sz="1197" kern="1200"/>
+  </cs:categoryAxis>
+  <cs:chartArea mods="allowNoFillOverride allowNoLineOverride">
+    <cs:lnRef idx="0"/>
+    <cs:fillRef idx="0"/>
+    <cs:effectRef idx="0"/>
+    <cs:fontRef idx="minor">
+      <a:schemeClr val="tx1"/>
+    </cs:fontRef>
+    <cs:spPr>
+      <a:solidFill>
+        <a:schemeClr val="bg1"/>
+      </a:solidFill>
+      <a:ln w="9525" cap="flat" cmpd="sng" algn="ctr">
+        <a:solidFill>
+          <a:schemeClr val="tx1">
+            <a:lumMod val="15000"/>
+            <a:lumOff val="85000"/>
+          </a:schemeClr>
+        </a:solidFill>
+        <a:round/>
+      </a:ln>
+    </cs:spPr>
+    <cs:defRPr sz="1197" kern="1200"/>
+  </cs:chartArea>
+  <cs:dataLabel>
+    <cs:lnRef idx="0"/>
+    <cs:fillRef idx="0"/>
+    <cs:effectRef idx="0"/>
+    <cs:fontRef idx="minor">
+      <a:schemeClr val="tx1">
+        <a:lumMod val="75000"/>
+        <a:lumOff val="25000"/>
+      </a:schemeClr>
+    </cs:fontRef>
+    <cs:defRPr sz="1197" kern="1200"/>
+  </cs:dataLabel>
+  <cs:dataLabelCallout>
+    <cs:lnRef idx="0"/>
+    <cs:fillRef idx="0"/>
+    <cs:effectRef idx="0"/>
+    <cs:fontRef idx="minor">
+      <a:schemeClr val="dk1">
+        <a:lumMod val="65000"/>
+        <a:lumOff val="35000"/>
+      </a:schemeClr>
+    </cs:fontRef>
+    <cs:spPr>
+      <a:solidFill>
+        <a:schemeClr val="lt1"/>
+      </a:solidFill>
+      <a:ln>
+        <a:solidFill>
+          <a:schemeClr val="dk1">
+            <a:lumMod val="25000"/>
+            <a:lumOff val="75000"/>
+          </a:schemeClr>
+        </a:solidFill>
+      </a:ln>
+    </cs:spPr>
+    <cs:defRPr sz="1197" kern="1200"/>
+    <cs:bodyPr rot="0" spcFirstLastPara="1" vertOverflow="clip" horzOverflow="clip" vert="horz" wrap="square" lIns="36576" tIns="18288" rIns="36576" bIns="18288" anchor="ctr" anchorCtr="1">
+      <a:spAutoFit/>
+    </cs:bodyPr>
+  </cs:dataLabelCallout>
+  <cs:dataPoint>
+    <cs:lnRef idx="0"/>
+    <cs:fillRef idx="1">
+      <cs:styleClr val="auto"/>
+    </cs:fillRef>
+    <cs:effectRef idx="0"/>
+    <cs:fontRef idx="minor">
+      <a:schemeClr val="tx1"/>
+    </cs:fontRef>
+    <cs:spPr>
+      <a:ln w="19050">
+        <a:solidFill>
+          <a:schemeClr val="lt1"/>
+        </a:solidFill>
+      </a:ln>
+    </cs:spPr>
+  </cs:dataPoint>
+  <cs:dataPoint3D>
+    <cs:lnRef idx="0"/>
+    <cs:fillRef idx="1">
+      <cs:styleClr val="auto"/>
+    </cs:fillRef>
+    <cs:effectRef idx="0"/>
+    <cs:fontRef idx="minor">
+      <a:schemeClr val="tx1"/>
+    </cs:fontRef>
+    <cs:spPr>
+      <a:ln w="25400">
+        <a:solidFill>
+          <a:schemeClr val="lt1"/>
+        </a:solidFill>
+      </a:ln>
+    </cs:spPr>
+  </cs:dataPoint3D>
+  <cs:dataPointLine>
+    <cs:lnRef idx="0">
+      <cs:styleClr val="auto"/>
+    </cs:lnRef>
+    <cs:fillRef idx="0"/>
+    <cs:effectRef idx="0"/>
+    <cs:fontRef idx="minor">
+      <a:schemeClr val="tx1"/>
+    </cs:fontRef>
+    <cs:spPr>
+      <a:ln w="28575" cap="rnd">
+        <a:solidFill>
+          <a:schemeClr val="phClr"/>
+        </a:solidFill>
+        <a:round/>
+      </a:ln>
+    </cs:spPr>
+  </cs:dataPointLine>
+  <cs:dataPointMarker>
+    <cs:lnRef idx="0">
+      <cs:styleClr val="auto"/>
+    </cs:lnRef>
+    <cs:fillRef idx="1">
+      <cs:styleClr val="auto"/>
+    </cs:fillRef>
+    <cs:effectRef idx="0"/>
+    <cs:fontRef idx="minor">
+      <a:schemeClr val="tx1"/>
+    </cs:fontRef>
+    <cs:spPr>
+      <a:ln w="9525">
+        <a:solidFill>
+          <a:schemeClr val="phClr"/>
+        </a:solidFill>
+      </a:ln>
+    </cs:spPr>
+  </cs:dataPointMarker>
+  <cs:dataPointMarkerLayout symbol="circle" size="5"/>
+  <cs:dataPointWireframe>
+    <cs:lnRef idx="0">
+      <cs:styleClr val="auto"/>
+    </cs:lnRef>
+    <cs:fillRef idx="0"/>
+    <cs:effectRef idx="0"/>
+    <cs:fontRef idx="minor">
+      <a:schemeClr val="tx1"/>
+    </cs:fontRef>
+    <cs:spPr>
+      <a:ln w="9525" cap="rnd">
+        <a:solidFill>
+          <a:schemeClr val="phClr"/>
+        </a:solidFill>
+        <a:round/>
+      </a:ln>
+    </cs:spPr>
+  </cs:dataPointWireframe>
+  <cs:dataTable>
+    <cs:lnRef idx="0"/>
+    <cs:fillRef idx="0"/>
+    <cs:effectRef idx="0"/>
+    <cs:fontRef idx="minor">
+      <a:schemeClr val="tx1">
+        <a:lumMod val="65000"/>
+        <a:lumOff val="35000"/>
+      </a:schemeClr>
+    </cs:fontRef>
+    <cs:spPr>
+      <a:noFill/>
+      <a:ln w="9525" cap="flat" cmpd="sng" algn="ctr">
+        <a:solidFill>
+          <a:schemeClr val="tx1">
+            <a:lumMod val="15000"/>
+            <a:lumOff val="85000"/>
+          </a:schemeClr>
+        </a:solidFill>
+        <a:round/>
+      </a:ln>
+    </cs:spPr>
+    <cs:defRPr sz="1197" kern="1200"/>
+  </cs:dataTable>
+  <cs:downBar>
+    <cs:lnRef idx="0"/>
+    <cs:fillRef idx="0"/>
+    <cs:effectRef idx="0"/>
+    <cs:fontRef idx="minor">
+      <a:schemeClr val="tx1"/>
+    </cs:fontRef>
+    <cs:spPr>
+      <a:solidFill>
+        <a:schemeClr val="dk1">
+          <a:lumMod val="75000"/>
+          <a:lumOff val="25000"/>
+        </a:schemeClr>
+      </a:solidFill>
+      <a:ln w="9525" cap="flat" cmpd="sng" algn="ctr">
+        <a:solidFill>
+          <a:schemeClr val="tx1">
+            <a:lumMod val="65000"/>
+            <a:lumOff val="35000"/>
+          </a:schemeClr>
+        </a:solidFill>
+        <a:round/>
+      </a:ln>
+    </cs:spPr>
+  </cs:downBar>
+  <cs:dropLine>
+    <cs:lnRef idx="0"/>
+    <cs:fillRef idx="0"/>
+    <cs:effectRef idx="0"/>
+    <cs:fontRef idx="minor">
+      <a:schemeClr val="tx1"/>
+    </cs:fontRef>
+    <cs:spPr>
+      <a:ln w="9525" cap="flat" cmpd="sng" algn="ctr">
+        <a:solidFill>
+          <a:schemeClr val="tx1">
+            <a:lumMod val="35000"/>
+            <a:lumOff val="65000"/>
+          </a:schemeClr>
+        </a:solidFill>
+        <a:round/>
+      </a:ln>
+    </cs:spPr>
+  </cs:dropLine>
+  <cs:errorBar>
+    <cs:lnRef idx="0"/>
+    <cs:fillRef idx="0"/>
+    <cs:effectRef idx="0"/>
+    <cs:fontRef idx="minor">
+      <a:schemeClr val="tx1"/>
+    </cs:fontRef>
+    <cs:spPr>
+      <a:ln w="9525" cap="flat" cmpd="sng" algn="ctr">
+        <a:solidFill>
+          <a:schemeClr val="tx1">
+            <a:lumMod val="65000"/>
+            <a:lumOff val="35000"/>
+          </a:schemeClr>
+        </a:solidFill>
+        <a:round/>
+      </a:ln>
+    </cs:spPr>
+  </cs:errorBar>
+  <cs:floor>
+    <cs:lnRef idx="0"/>
+    <cs:fillRef idx="0"/>
+    <cs:effectRef idx="0"/>
+    <cs:fontRef idx="minor">
+      <a:schemeClr val="tx1"/>
+    </cs:fontRef>
+    <cs:spPr>
+      <a:noFill/>
+      <a:ln>
+        <a:noFill/>
+      </a:ln>
+    </cs:spPr>
+  </cs:floor>
+  <cs:gridlineMajor>
+    <cs:lnRef idx="0"/>
+    <cs:fillRef idx="0"/>
+    <cs:effectRef idx="0"/>
+    <cs:fontRef idx="minor">
+      <a:schemeClr val="tx1"/>
+    </cs:fontRef>
+    <cs:spPr>
+      <a:ln w="9525" cap="flat" cmpd="sng" algn="ctr">
+        <a:solidFill>
+          <a:schemeClr val="tx1">
+            <a:lumMod val="15000"/>
+            <a:lumOff val="85000"/>
+          </a:schemeClr>
+        </a:solidFill>
+        <a:round/>
+      </a:ln>
+    </cs:spPr>
+  </cs:gridlineMajor>
+  <cs:gridlineMinor>
+    <cs:lnRef idx="0"/>
+    <cs:fillRef idx="0"/>
+    <cs:effectRef idx="0"/>
+    <cs:fontRef idx="minor">
+      <a:schemeClr val="tx1"/>
+    </cs:fontRef>
+    <cs:spPr>
+      <a:ln w="9525" cap="flat" cmpd="sng" algn="ctr">
+        <a:solidFill>
+          <a:schemeClr val="tx1">
+            <a:lumMod val="5000"/>
+            <a:lumOff val="95000"/>
+          </a:schemeClr>
+        </a:solidFill>
+        <a:round/>
+      </a:ln>
+    </cs:spPr>
+  </cs:gridlineMinor>
+  <cs:hiLoLine>
+    <cs:lnRef idx="0"/>
+    <cs:fillRef idx="0"/>
+    <cs:effectRef idx="0"/>
+    <cs:fontRef idx="minor">
+      <a:schemeClr val="tx1"/>
+    </cs:fontRef>
+    <cs:spPr>
+      <a:ln w="9525" cap="flat" cmpd="sng" algn="ctr">
+        <a:solidFill>
+          <a:schemeClr val="tx1">
+            <a:lumMod val="50000"/>
+            <a:lumOff val="50000"/>
+          </a:schemeClr>
+        </a:solidFill>
+        <a:round/>
+      </a:ln>
+    </cs:spPr>
+  </cs:hiLoLine>
+  <cs:leaderLine>
+    <cs:lnRef idx="0"/>
+    <cs:fillRef idx="0"/>
+    <cs:effectRef idx="0"/>
+    <cs:fontRef idx="minor">
+      <a:schemeClr val="tx1"/>
+    </cs:fontRef>
+    <cs:spPr>
+      <a:ln w="9525" cap="flat" cmpd="sng" algn="ctr">
+        <a:solidFill>
+          <a:schemeClr val="tx1">
+            <a:lumMod val="35000"/>
+            <a:lumOff val="65000"/>
+          </a:schemeClr>
+        </a:solidFill>
+        <a:round/>
+      </a:ln>
+    </cs:spPr>
+  </cs:leaderLine>
+  <cs:legend>
+    <cs:lnRef idx="0"/>
+    <cs:fillRef idx="0"/>
+    <cs:effectRef idx="0"/>
+    <cs:fontRef idx="minor">
+      <a:schemeClr val="tx1">
+        <a:lumMod val="65000"/>
+        <a:lumOff val="35000"/>
+      </a:schemeClr>
+    </cs:fontRef>
+    <cs:defRPr sz="1197" kern="1200"/>
+  </cs:legend>
+  <cs:plotArea mods="allowNoFillOverride allowNoLineOverride">
+    <cs:lnRef idx="0"/>
+    <cs:fillRef idx="0"/>
+    <cs:effectRef idx="0"/>
+    <cs:fontRef idx="minor">
+      <a:schemeClr val="tx1"/>
+    </cs:fontRef>
+  </cs:plotArea>
+  <cs:plotArea3D mods="allowNoFillOverride allowNoLineOverride">
+    <cs:lnRef idx="0"/>
+    <cs:fillRef idx="0"/>
+    <cs:effectRef idx="0"/>
+    <cs:fontRef idx="minor">
+      <a:schemeClr val="tx1"/>
+    </cs:fontRef>
+  </cs:plotArea3D>
+  <cs:seriesAxis>
+    <cs:lnRef idx="0"/>
+    <cs:fillRef idx="0"/>
+    <cs:effectRef idx="0"/>
+    <cs:fontRef idx="minor">
+      <a:schemeClr val="tx1">
+        <a:lumMod val="65000"/>
+        <a:lumOff val="35000"/>
+      </a:schemeClr>
+    </cs:fontRef>
+    <cs:defRPr sz="1197" kern="1200"/>
+  </cs:seriesAxis>
+  <cs:seriesLine>
+    <cs:lnRef idx="0"/>
+    <cs:fillRef idx="0"/>
+    <cs:effectRef idx="0"/>
+    <cs:fontRef idx="minor">
+      <a:schemeClr val="tx1"/>
+    </cs:fontRef>
+    <cs:spPr>
+      <a:ln w="9525" cap="flat" cmpd="sng" algn="ctr">
+        <a:solidFill>
+          <a:schemeClr val="tx1">
+            <a:lumMod val="35000"/>
+            <a:lumOff val="65000"/>
+          </a:schemeClr>
+        </a:solidFill>
+        <a:round/>
+      </a:ln>
+    </cs:spPr>
+  </cs:seriesLine>
+  <cs:title>
+    <cs:lnRef idx="0"/>
+    <cs:fillRef idx="0"/>
+    <cs:effectRef idx="0"/>
+    <cs:fontRef idx="minor">
+      <a:schemeClr val="tx1">
+        <a:lumMod val="65000"/>
+        <a:lumOff val="35000"/>
+      </a:schemeClr>
+    </cs:fontRef>
+    <cs:defRPr sz="1862" b="0" kern="1200" spc="0" baseline="0"/>
+  </cs:title>
+  <cs:trendline>
+    <cs:lnRef idx="0">
+      <cs:styleClr val="auto"/>
+    </cs:lnRef>
+    <cs:fillRef idx="0"/>
+    <cs:effectRef idx="0"/>
+    <cs:fontRef idx="minor">
+      <a:schemeClr val="tx1"/>
+    </cs:fontRef>
+    <cs:spPr>
+      <a:ln w="19050" cap="rnd">
+        <a:solidFill>
+          <a:schemeClr val="phClr"/>
+        </a:solidFill>
+        <a:prstDash val="sysDot"/>
+      </a:ln>
+    </cs:spPr>
+  </cs:trendline>
+  <cs:trendlineLabel>
+    <cs:lnRef idx="0"/>
+    <cs:fillRef idx="0"/>
+    <cs:effectRef idx="0"/>
+    <cs:fontRef idx="minor">
+      <a:schemeClr val="tx1">
+        <a:lumMod val="65000"/>
+        <a:lumOff val="35000"/>
+      </a:schemeClr>
+    </cs:fontRef>
+    <cs:defRPr sz="1197" kern="1200"/>
+  </cs:trendlineLabel>
+  <cs:upBar>
+    <cs:lnRef idx="0"/>
+    <cs:fillRef idx="0"/>
+    <cs:effectRef idx="0"/>
+    <cs:fontRef idx="minor">
+      <a:schemeClr val="tx1"/>
+    </cs:fontRef>
+    <cs:spPr>
+      <a:solidFill>
+        <a:schemeClr val="lt1"/>
+      </a:solidFill>
+      <a:ln w="9525" cap="flat" cmpd="sng" algn="ctr">
+        <a:solidFill>
+          <a:schemeClr val="tx1">
+            <a:lumMod val="65000"/>
+            <a:lumOff val="35000"/>
+          </a:schemeClr>
+        </a:solidFill>
+        <a:round/>
+      </a:ln>
+    </cs:spPr>
+  </cs:upBar>
+  <cs:valueAxis>
+    <cs:lnRef idx="0"/>
+    <cs:fillRef idx="0"/>
+    <cs:effectRef idx="0"/>
+    <cs:fontRef idx="minor">
+      <a:schemeClr val="tx1">
+        <a:lumMod val="65000"/>
+        <a:lumOff val="35000"/>
+      </a:schemeClr>
+    </cs:fontRef>
+    <cs:defRPr sz="1197" kern="1200"/>
+  </cs:valueAxis>
+  <cs:wall>
+    <cs:lnRef idx="0"/>
+    <cs:fillRef idx="0"/>
+    <cs:effectRef idx="0"/>
+    <cs:fontRef idx="minor">
+      <a:schemeClr val="tx1"/>
+    </cs:fontRef>
+    <cs:spPr>
+      <a:noFill/>
+      <a:ln>
+        <a:noFill/>
+      </a:ln>
+    </cs:spPr>
+  </cs:wall>
+</cs:chartStyle>
+</file>
+
 <file path=ppt/handoutMasters/handoutMaster1.xml><?xml version="1.0" encoding="utf-8"?>
 <p:handoutMaster xmlns:a="http://schemas.openxmlformats.org/drawingml/2006/main" xmlns:r="http://schemas.openxmlformats.org/officeDocument/2006/relationships" xmlns:p="http://schemas.openxmlformats.org/presentationml/2006/main">
   <p:cSld>
@@ -245,7 +1094,7 @@
             <a:pPr rtl="0"/>
             <a:fld id="{A2D0F6F2-A277-4DB2-B78A-B20601D4CE50}" type="datetime1">
               <a:rPr lang="pt-BR" smtClean="0"/>
-              <a:t>16/11/2020</a:t>
+              <a:t>17/11/2020</a:t>
             </a:fld>
             <a:endParaRPr lang="pt-BR" dirty="0"/>
           </a:p>
@@ -427,7 +1276,7 @@
             <a:fld id="{0C4AB883-099A-417B-9D0B-82E8D6B879E6}" type="datetime1">
               <a:rPr lang="pt-BR" smtClean="0"/>
               <a:pPr/>
-              <a:t>16/11/2020</a:t>
+              <a:t>17/11/2020</a:t>
             </a:fld>
             <a:endParaRPr lang="pt-BR" dirty="0"/>
           </a:p>
@@ -1305,7 +2154,7 @@
             <a:pPr rtl="0"/>
             <a:fld id="{BCFAAAB6-A2C6-4A85-A3A1-98EFBA61C967}" type="slidenum">
               <a:rPr lang="pt-BR" smtClean="0"/>
-              <a:t>7</a:t>
+              <a:t>8</a:t>
             </a:fld>
             <a:endParaRPr lang="pt-BR"/>
           </a:p>
@@ -9840,15 +10689,6 @@
           <a:solidFill>
             <a:srgbClr val="FFFFFF"/>
           </a:solidFill>
-          <a:extLst>
-            <a:ext uri="{909E8E84-426E-40DD-AFC4-6F175D3DCCD1}">
-              <a14:hiddenFill xmlns:a14="http://schemas.microsoft.com/office/drawing/2010/main">
-                <a:solidFill>
-                  <a:srgbClr val="FFFFFF"/>
-                </a:solidFill>
-              </a14:hiddenFill>
-            </a:ext>
-          </a:extLst>
         </p:spPr>
       </p:pic>
     </p:spTree>
@@ -10546,34 +11386,6 @@
           </a:p>
         </p:txBody>
       </p:sp>
-      <p:pic>
-        <p:nvPicPr>
-          <p:cNvPr id="38" name="Espaço Reservado para Imagem 37" descr="Foto profissional de membro da equipe">
-            <a:extLst>
-              <a:ext uri="{FF2B5EF4-FFF2-40B4-BE49-F238E27FC236}">
-                <a16:creationId xmlns:a16="http://schemas.microsoft.com/office/drawing/2014/main" id="{B089F130-278C-4ECC-9350-8F2CA8AE8B0B}"/>
-              </a:ext>
-            </a:extLst>
-          </p:cNvPr>
-          <p:cNvPicPr>
-            <a:picLocks noGrp="1" noChangeAspect="1"/>
-          </p:cNvPicPr>
-          <p:nvPr>
-            <p:ph type="pic" sz="quarter" idx="21"/>
-          </p:nvPr>
-        </p:nvPicPr>
-        <p:blipFill rotWithShape="1">
-          <a:blip r:embed="rId3"/>
-          <a:srcRect t="233" b="233"/>
-          <a:stretch/>
-        </p:blipFill>
-        <p:spPr>
-          <a:xfrm>
-            <a:off x="10032247" y="2788539"/>
-            <a:ext cx="1463040" cy="1481328"/>
-          </a:xfrm>
-        </p:spPr>
-      </p:pic>
       <p:sp>
         <p:nvSpPr>
           <p:cNvPr id="30" name="Espaço Reservado para Texto 29">
@@ -10719,7 +11531,7 @@
         </p:spPr>
         <p:txBody>
           <a:bodyPr rtlCol="0">
-            <a:normAutofit/>
+            <a:normAutofit lnSpcReduction="10000"/>
           </a:bodyPr>
           <a:lstStyle/>
           <a:p>
@@ -10733,12 +11545,27 @@
             <a:pPr rtl="0"/>
             <a:r>
               <a:rPr lang="pt-BR" sz="1400" dirty="0"/>
-              <a:t>Desenvolvedor Front-</a:t>
+              <a:t>Desenvolvedor </a:t>
+            </a:r>
+          </a:p>
+          <a:p>
+            <a:pPr rtl="0"/>
+            <a:r>
+              <a:rPr lang="pt-BR" sz="1400" dirty="0"/>
+              <a:t>Front-</a:t>
             </a:r>
             <a:r>
               <a:rPr lang="pt-BR" sz="1400" dirty="0" err="1"/>
               <a:t>end</a:t>
             </a:r>
+            <a:r>
+              <a:rPr lang="pt-BR" sz="1400" dirty="0"/>
+              <a:t> especialista em </a:t>
+            </a:r>
+            <a:r>
+              <a:rPr lang="pt-BR" sz="1400" dirty="0" err="1"/>
+              <a:t>React</a:t>
+            </a:r>
             <a:endParaRPr lang="pt-BR" sz="1400" dirty="0"/>
           </a:p>
           <a:p>
@@ -10771,7 +11598,7 @@
         </p:spPr>
         <p:txBody>
           <a:bodyPr rtlCol="0">
-            <a:normAutofit/>
+            <a:normAutofit fontScale="92500" lnSpcReduction="10000"/>
           </a:bodyPr>
           <a:lstStyle/>
           <a:p>
@@ -10796,7 +11623,7 @@
             </a:r>
             <a:r>
               <a:rPr lang="pt-BR" sz="1400" dirty="0"/>
-              <a:t> </a:t>
+              <a:t> especialista em C# </a:t>
             </a:r>
           </a:p>
           <a:p>
@@ -10855,7 +11682,7 @@
           <p:nvPr/>
         </p:nvPicPr>
         <p:blipFill>
-          <a:blip r:embed="rId4">
+          <a:blip r:embed="rId3">
             <a:extLst>
               <a:ext uri="{28A0092B-C50C-407E-A947-70E740481C1C}">
                 <a14:useLocalDpi xmlns:a14="http://schemas.microsoft.com/office/drawing/2010/main" val="0"/>
@@ -10902,7 +11729,7 @@
           <p:nvPr/>
         </p:nvPicPr>
         <p:blipFill>
-          <a:blip r:embed="rId5">
+          <a:blip r:embed="rId4">
             <a:extLst>
               <a:ext uri="{28A0092B-C50C-407E-A947-70E740481C1C}">
                 <a14:useLocalDpi xmlns:a14="http://schemas.microsoft.com/office/drawing/2010/main" val="0"/>
@@ -10949,6 +11776,36 @@
           <p:nvPr/>
         </p:nvPicPr>
         <p:blipFill>
+          <a:blip r:embed="rId5"/>
+          <a:stretch>
+            <a:fillRect/>
+          </a:stretch>
+        </p:blipFill>
+        <p:spPr>
+          <a:xfrm>
+            <a:off x="6818611" y="2788539"/>
+            <a:ext cx="1462089" cy="1481328"/>
+          </a:xfrm>
+          <a:prstGeom prst="rect">
+            <a:avLst/>
+          </a:prstGeom>
+        </p:spPr>
+      </p:pic>
+      <p:pic>
+        <p:nvPicPr>
+          <p:cNvPr id="5" name="Imagem 4">
+            <a:extLst>
+              <a:ext uri="{FF2B5EF4-FFF2-40B4-BE49-F238E27FC236}">
+                <a16:creationId xmlns:a16="http://schemas.microsoft.com/office/drawing/2014/main" id="{7AA9FE9D-4D70-40C3-AB24-8F285EC67C03}"/>
+              </a:ext>
+            </a:extLst>
+          </p:cNvPr>
+          <p:cNvPicPr>
+            <a:picLocks noChangeAspect="1"/>
+          </p:cNvPicPr>
+          <p:nvPr/>
+        </p:nvPicPr>
+        <p:blipFill>
           <a:blip r:embed="rId6"/>
           <a:stretch>
             <a:fillRect/>
@@ -10956,8 +11813,8 @@
         </p:blipFill>
         <p:spPr>
           <a:xfrm>
-            <a:off x="6818611" y="2788539"/>
-            <a:ext cx="1462089" cy="1481328"/>
+            <a:off x="9965576" y="2788539"/>
+            <a:ext cx="1596382" cy="1481328"/>
           </a:xfrm>
           <a:prstGeom prst="rect">
             <a:avLst/>
@@ -10999,6 +11856,225 @@
           <p:cNvPr id="2" name="Título 1">
             <a:extLst>
               <a:ext uri="{FF2B5EF4-FFF2-40B4-BE49-F238E27FC236}">
+                <a16:creationId xmlns:a16="http://schemas.microsoft.com/office/drawing/2014/main" id="{4D9C6157-77CB-4277-91C5-CBABEE850DF1}"/>
+              </a:ext>
+            </a:extLst>
+          </p:cNvPr>
+          <p:cNvSpPr>
+            <a:spLocks noGrp="1"/>
+          </p:cNvSpPr>
+          <p:nvPr>
+            <p:ph type="title"/>
+          </p:nvPr>
+        </p:nvSpPr>
+        <p:spPr>
+          <a:xfrm>
+            <a:off x="1115568" y="522007"/>
+            <a:ext cx="10168128" cy="1004952"/>
+          </a:xfrm>
+        </p:spPr>
+        <p:txBody>
+          <a:bodyPr/>
+          <a:lstStyle/>
+          <a:p>
+            <a:r>
+              <a:rPr lang="pt-BR" dirty="0"/>
+              <a:t>Lucro por ano</a:t>
+            </a:r>
+          </a:p>
+        </p:txBody>
+      </p:sp>
+      <p:sp>
+        <p:nvSpPr>
+          <p:cNvPr id="6" name="Espaço Reservado para Número de Slide 5">
+            <a:extLst>
+              <a:ext uri="{FF2B5EF4-FFF2-40B4-BE49-F238E27FC236}">
+                <a16:creationId xmlns:a16="http://schemas.microsoft.com/office/drawing/2014/main" id="{8E4930A2-7C79-4D04-AACE-0C0AAB35B57D}"/>
+              </a:ext>
+            </a:extLst>
+          </p:cNvPr>
+          <p:cNvSpPr>
+            <a:spLocks noGrp="1"/>
+          </p:cNvSpPr>
+          <p:nvPr>
+            <p:ph type="sldNum" sz="quarter" idx="12"/>
+          </p:nvPr>
+        </p:nvSpPr>
+        <p:spPr/>
+        <p:txBody>
+          <a:bodyPr/>
+          <a:lstStyle/>
+          <a:p>
+            <a:pPr rtl="0"/>
+            <a:fld id="{A65A5C87-DF58-40C8-B092-1DE63DB4547E}" type="slidenum">
+              <a:rPr lang="pt-BR" noProof="0" smtClean="0"/>
+              <a:t>7</a:t>
+            </a:fld>
+            <a:endParaRPr lang="pt-BR" noProof="0"/>
+          </a:p>
+        </p:txBody>
+      </p:sp>
+      <p:graphicFrame>
+        <p:nvGraphicFramePr>
+          <p:cNvPr id="8" name="Espaço Reservado para Conteúdo 7">
+            <a:extLst>
+              <a:ext uri="{FF2B5EF4-FFF2-40B4-BE49-F238E27FC236}">
+                <a16:creationId xmlns:a16="http://schemas.microsoft.com/office/drawing/2014/main" id="{FBDD9E99-FFB3-4496-93FC-17B947051C0E}"/>
+              </a:ext>
+            </a:extLst>
+          </p:cNvPr>
+          <p:cNvGraphicFramePr>
+            <a:graphicFrameLocks noGrp="1"/>
+          </p:cNvGraphicFramePr>
+          <p:nvPr>
+            <p:ph idx="1"/>
+            <p:extLst>
+              <p:ext uri="{D42A27DB-BD31-4B8C-83A1-F6EECF244321}">
+                <p14:modId xmlns:p14="http://schemas.microsoft.com/office/powerpoint/2010/main" val="934132001"/>
+              </p:ext>
+            </p:extLst>
+          </p:nvPr>
+        </p:nvGraphicFramePr>
+        <p:xfrm>
+          <a:off x="566885" y="2433699"/>
+          <a:ext cx="5026047" cy="3694112"/>
+        </p:xfrm>
+        <a:graphic>
+          <a:graphicData uri="http://schemas.openxmlformats.org/drawingml/2006/chart">
+            <c:chart xmlns:c="http://schemas.openxmlformats.org/drawingml/2006/chart" xmlns:r="http://schemas.openxmlformats.org/officeDocument/2006/relationships" r:id="rId2"/>
+          </a:graphicData>
+        </a:graphic>
+      </p:graphicFrame>
+      <p:sp>
+        <p:nvSpPr>
+          <p:cNvPr id="9" name="Retângulo 8">
+            <a:extLst>
+              <a:ext uri="{FF2B5EF4-FFF2-40B4-BE49-F238E27FC236}">
+                <a16:creationId xmlns:a16="http://schemas.microsoft.com/office/drawing/2014/main" id="{18093367-E732-4D32-A66A-DF2026CBD507}"/>
+              </a:ext>
+            </a:extLst>
+          </p:cNvPr>
+          <p:cNvSpPr/>
+          <p:nvPr/>
+        </p:nvSpPr>
+        <p:spPr>
+          <a:xfrm>
+            <a:off x="7111013" y="2479698"/>
+            <a:ext cx="3959441" cy="3228644"/>
+          </a:xfrm>
+          <a:prstGeom prst="rect">
+            <a:avLst/>
+          </a:prstGeom>
+          <a:ln>
+            <a:solidFill>
+              <a:schemeClr val="bg1">
+                <a:lumMod val="85000"/>
+              </a:schemeClr>
+            </a:solidFill>
+          </a:ln>
+        </p:spPr>
+        <p:style>
+          <a:lnRef idx="2">
+            <a:schemeClr val="dk1"/>
+          </a:lnRef>
+          <a:fillRef idx="1">
+            <a:schemeClr val="lt1"/>
+          </a:fillRef>
+          <a:effectRef idx="0">
+            <a:schemeClr val="dk1"/>
+          </a:effectRef>
+          <a:fontRef idx="minor">
+            <a:schemeClr val="dk1"/>
+          </a:fontRef>
+        </p:style>
+        <p:txBody>
+          <a:bodyPr rtlCol="0" anchor="ctr"/>
+          <a:lstStyle/>
+          <a:p>
+            <a:r>
+              <a:rPr lang="pt-BR" dirty="0"/>
+              <a:t>Plano </a:t>
+            </a:r>
+            <a:r>
+              <a:rPr lang="pt-BR" dirty="0" err="1"/>
+              <a:t>free</a:t>
+            </a:r>
+            <a:r>
+              <a:rPr lang="pt-BR" dirty="0"/>
+              <a:t>:</a:t>
+            </a:r>
+          </a:p>
+          <a:p>
+            <a:r>
+              <a:rPr lang="pt-BR" dirty="0"/>
+              <a:t>  5 quadros e 5 times</a:t>
+            </a:r>
+          </a:p>
+          <a:p>
+            <a:pPr algn="ctr"/>
+            <a:endParaRPr lang="pt-BR" dirty="0"/>
+          </a:p>
+          <a:p>
+            <a:r>
+              <a:rPr lang="pt-BR" dirty="0"/>
+              <a:t>Plano Premium: </a:t>
+            </a:r>
+          </a:p>
+          <a:p>
+            <a:r>
+              <a:rPr lang="pt-BR" dirty="0"/>
+              <a:t>   Quadros e times Ilimitados</a:t>
+            </a:r>
+          </a:p>
+          <a:p>
+            <a:endParaRPr lang="pt-BR" dirty="0"/>
+          </a:p>
+          <a:p>
+            <a:endParaRPr lang="pt-BR" dirty="0"/>
+          </a:p>
+          <a:p>
+            <a:r>
+              <a:rPr lang="pt-BR" dirty="0"/>
+              <a:t>Levando em consideração o gráfico em um ano nós temos um lucro de R$180.000</a:t>
+            </a:r>
+          </a:p>
+        </p:txBody>
+      </p:sp>
+    </p:spTree>
+    <p:extLst>
+      <p:ext uri="{BB962C8B-B14F-4D97-AF65-F5344CB8AC3E}">
+        <p14:creationId xmlns:p14="http://schemas.microsoft.com/office/powerpoint/2010/main" val="624288121"/>
+      </p:ext>
+    </p:extLst>
+  </p:cSld>
+  <p:clrMapOvr>
+    <a:masterClrMapping/>
+  </p:clrMapOvr>
+</p:sld>
+</file>
+
+<file path=ppt/slides/slide8.xml><?xml version="1.0" encoding="utf-8"?>
+<p:sld xmlns:a="http://schemas.openxmlformats.org/drawingml/2006/main" xmlns:r="http://schemas.openxmlformats.org/officeDocument/2006/relationships" xmlns:p="http://schemas.openxmlformats.org/presentationml/2006/main">
+  <p:cSld>
+    <p:spTree>
+      <p:nvGrpSpPr>
+        <p:cNvPr id="1" name=""/>
+        <p:cNvGrpSpPr/>
+        <p:nvPr/>
+      </p:nvGrpSpPr>
+      <p:grpSpPr>
+        <a:xfrm>
+          <a:off x="0" y="0"/>
+          <a:ext cx="0" cy="0"/>
+          <a:chOff x="0" y="0"/>
+          <a:chExt cx="0" cy="0"/>
+        </a:xfrm>
+      </p:grpSpPr>
+      <p:sp>
+        <p:nvSpPr>
+          <p:cNvPr id="2" name="Título 1">
+            <a:extLst>
+              <a:ext uri="{FF2B5EF4-FFF2-40B4-BE49-F238E27FC236}">
                 <a16:creationId xmlns:a16="http://schemas.microsoft.com/office/drawing/2014/main" id="{32392E3A-DB80-46C8-A227-EE0F7E87D747}"/>
               </a:ext>
             </a:extLst>
@@ -11248,7 +12324,7 @@
             <a:pPr rtl="0"/>
             <a:fld id="{A65A5C87-DF58-40C8-B092-1DE63DB4547E}" type="slidenum">
               <a:rPr lang="pt-BR" smtClean="0"/>
-              <a:t>7</a:t>
+              <a:t>8</a:t>
             </a:fld>
             <a:endParaRPr lang="pt-BR"/>
           </a:p>
@@ -12179,24 +13255,6 @@
 </file>
 
 <file path=customXml/item1.xml><?xml version="1.0" encoding="utf-8"?>
-<?mso-contentType ?>
-<FormTemplates xmlns="http://schemas.microsoft.com/sharepoint/v3/contenttype/forms">
-  <Display>DocumentLibraryForm</Display>
-  <Edit>DocumentLibraryForm</Edit>
-  <New>DocumentLibraryForm</New>
-</FormTemplates>
-</file>
-
-<file path=customXml/item2.xml><?xml version="1.0" encoding="utf-8"?>
-<p:properties xmlns:p="http://schemas.microsoft.com/office/2006/metadata/properties" xmlns:xsi="http://www.w3.org/2001/XMLSchema-instance" xmlns:pc="http://schemas.microsoft.com/office/infopath/2007/PartnerControls">
-  <documentManagement>
-    <Status xmlns="71af3243-3dd4-4a8d-8c0d-dd76da1f02a5">Not started</Status>
-    <MediaServiceKeyPoints xmlns="71af3243-3dd4-4a8d-8c0d-dd76da1f02a5" xsi:nil="true"/>
-  </documentManagement>
-</p:properties>
-</file>
-
-<file path=customXml/item3.xml><?xml version="1.0" encoding="utf-8"?>
 <ct:contentTypeSchema xmlns:ct="http://schemas.microsoft.com/office/2006/metadata/contentType" xmlns:ma="http://schemas.microsoft.com/office/2006/metadata/properties/metaAttributes" ct:_="" ma:_="" ma:contentTypeName="Document" ma:contentTypeID="0x01010079F111ED35F8CC479449609E8A0923A6" ma:contentTypeVersion="12" ma:contentTypeDescription="Create a new document." ma:contentTypeScope="" ma:versionID="426e97fa315356fffbdcd9876fe988c2">
   <xsd:schema xmlns:xsd="http://www.w3.org/2001/XMLSchema" xmlns:xs="http://www.w3.org/2001/XMLSchema" xmlns:p="http://schemas.microsoft.com/office/2006/metadata/properties" xmlns:ns2="71af3243-3dd4-4a8d-8c0d-dd76da1f02a5" xmlns:ns3="16c05727-aa75-4e4a-9b5f-8a80a1165891" targetNamespace="http://schemas.microsoft.com/office/2006/metadata/properties" ma:root="true" ma:fieldsID="14b8f0def80e6d70ce3def20c90759ae" ns2:_="" ns3:_="">
     <xsd:import namespace="71af3243-3dd4-4a8d-8c0d-dd76da1f02a5"/>
@@ -12417,25 +13475,25 @@
 </ct:contentTypeSchema>
 </file>
 
-<file path=customXml/itemProps1.xml><?xml version="1.0" encoding="utf-8"?>
-<ds:datastoreItem xmlns:ds="http://schemas.openxmlformats.org/officeDocument/2006/customXml" ds:itemID="{B927DC71-2909-427C-BDB0-3E47E2101517}">
-  <ds:schemaRefs>
-    <ds:schemaRef ds:uri="http://schemas.microsoft.com/sharepoint/v3/contenttype/forms"/>
-  </ds:schemaRefs>
-</ds:datastoreItem>
+<file path=customXml/item2.xml><?xml version="1.0" encoding="utf-8"?>
+<p:properties xmlns:p="http://schemas.microsoft.com/office/2006/metadata/properties" xmlns:xsi="http://www.w3.org/2001/XMLSchema-instance" xmlns:pc="http://schemas.microsoft.com/office/infopath/2007/PartnerControls">
+  <documentManagement>
+    <Status xmlns="71af3243-3dd4-4a8d-8c0d-dd76da1f02a5">Not started</Status>
+    <MediaServiceKeyPoints xmlns="71af3243-3dd4-4a8d-8c0d-dd76da1f02a5" xsi:nil="true"/>
+  </documentManagement>
+</p:properties>
 </file>
 
-<file path=customXml/itemProps2.xml><?xml version="1.0" encoding="utf-8"?>
-<ds:datastoreItem xmlns:ds="http://schemas.openxmlformats.org/officeDocument/2006/customXml" ds:itemID="{290D7697-8E53-4EA8-8CBB-9C19575257BF}">
-  <ds:schemaRefs>
-    <ds:schemaRef ds:uri="http://schemas.microsoft.com/office/2006/metadata/properties"/>
-    <ds:schemaRef ds:uri="http://schemas.microsoft.com/office/infopath/2007/PartnerControls"/>
-    <ds:schemaRef ds:uri="71af3243-3dd4-4a8d-8c0d-dd76da1f02a5"/>
-  </ds:schemaRefs>
-</ds:datastoreItem>
+<file path=customXml/item3.xml><?xml version="1.0" encoding="utf-8"?>
+<?mso-contentType ?>
+<FormTemplates xmlns="http://schemas.microsoft.com/sharepoint/v3/contenttype/forms">
+  <Display>DocumentLibraryForm</Display>
+  <Edit>DocumentLibraryForm</Edit>
+  <New>DocumentLibraryForm</New>
+</FormTemplates>
 </file>
 
-<file path=customXml/itemProps3.xml><?xml version="1.0" encoding="utf-8"?>
+<file path=customXml/itemProps1.xml><?xml version="1.0" encoding="utf-8"?>
 <ds:datastoreItem xmlns:ds="http://schemas.openxmlformats.org/officeDocument/2006/customXml" ds:itemID="{1DF0A252-5923-47A2-A53A-F9BF72908919}">
   <ds:schemaRefs>
     <ds:schemaRef ds:uri="http://schemas.microsoft.com/office/2006/metadata/contentType"/>
@@ -12452,4 +13510,22 @@
     <ds:schemaRef ds:uri="http://schemas.microsoft.com/internal/obd"/>
   </ds:schemaRefs>
 </ds:datastoreItem>
+</file>
+
+<file path=customXml/itemProps2.xml><?xml version="1.0" encoding="utf-8"?>
+<ds:datastoreItem xmlns:ds="http://schemas.openxmlformats.org/officeDocument/2006/customXml" ds:itemID="{290D7697-8E53-4EA8-8CBB-9C19575257BF}">
+  <ds:schemaRefs>
+    <ds:schemaRef ds:uri="http://schemas.microsoft.com/office/2006/metadata/properties"/>
+    <ds:schemaRef ds:uri="http://schemas.microsoft.com/office/infopath/2007/PartnerControls"/>
+    <ds:schemaRef ds:uri="71af3243-3dd4-4a8d-8c0d-dd76da1f02a5"/>
+  </ds:schemaRefs>
+</ds:datastoreItem>
+</file>
+
+<file path=customXml/itemProps3.xml><?xml version="1.0" encoding="utf-8"?>
+<ds:datastoreItem xmlns:ds="http://schemas.openxmlformats.org/officeDocument/2006/customXml" ds:itemID="{B927DC71-2909-427C-BDB0-3E47E2101517}">
+  <ds:schemaRefs>
+    <ds:schemaRef ds:uri="http://schemas.microsoft.com/sharepoint/v3/contenttype/forms"/>
+  </ds:schemaRefs>
+</ds:datastoreItem>
 </file>
</xml_diff>